<commit_message>
google login&logout, google play able
</commit_message>
<xml_diff>
--- a/화면정의서.pptx
+++ b/화면정의서.pptx
@@ -257,7 +257,7 @@
           <a:p>
             <a:fld id="{7043625E-8BC0-46E2-A81F-24B9F552ACCE}" type="datetimeFigureOut">
               <a:rPr lang="ko-KR" altLang="en-US" smtClean="0"/>
-              <a:t>2015-01-21</a:t>
+              <a:t>2015-01-23</a:t>
             </a:fld>
             <a:endParaRPr lang="ko-KR" altLang="en-US"/>
           </a:p>
@@ -427,7 +427,7 @@
           <a:p>
             <a:fld id="{7043625E-8BC0-46E2-A81F-24B9F552ACCE}" type="datetimeFigureOut">
               <a:rPr lang="ko-KR" altLang="en-US" smtClean="0"/>
-              <a:t>2015-01-21</a:t>
+              <a:t>2015-01-23</a:t>
             </a:fld>
             <a:endParaRPr lang="ko-KR" altLang="en-US"/>
           </a:p>
@@ -607,7 +607,7 @@
           <a:p>
             <a:fld id="{7043625E-8BC0-46E2-A81F-24B9F552ACCE}" type="datetimeFigureOut">
               <a:rPr lang="ko-KR" altLang="en-US" smtClean="0"/>
-              <a:t>2015-01-21</a:t>
+              <a:t>2015-01-23</a:t>
             </a:fld>
             <a:endParaRPr lang="ko-KR" altLang="en-US"/>
           </a:p>
@@ -777,7 +777,7 @@
           <a:p>
             <a:fld id="{7043625E-8BC0-46E2-A81F-24B9F552ACCE}" type="datetimeFigureOut">
               <a:rPr lang="ko-KR" altLang="en-US" smtClean="0"/>
-              <a:t>2015-01-21</a:t>
+              <a:t>2015-01-23</a:t>
             </a:fld>
             <a:endParaRPr lang="ko-KR" altLang="en-US"/>
           </a:p>
@@ -1023,7 +1023,7 @@
           <a:p>
             <a:fld id="{7043625E-8BC0-46E2-A81F-24B9F552ACCE}" type="datetimeFigureOut">
               <a:rPr lang="ko-KR" altLang="en-US" smtClean="0"/>
-              <a:t>2015-01-21</a:t>
+              <a:t>2015-01-23</a:t>
             </a:fld>
             <a:endParaRPr lang="ko-KR" altLang="en-US"/>
           </a:p>
@@ -1255,7 +1255,7 @@
           <a:p>
             <a:fld id="{7043625E-8BC0-46E2-A81F-24B9F552ACCE}" type="datetimeFigureOut">
               <a:rPr lang="ko-KR" altLang="en-US" smtClean="0"/>
-              <a:t>2015-01-21</a:t>
+              <a:t>2015-01-23</a:t>
             </a:fld>
             <a:endParaRPr lang="ko-KR" altLang="en-US"/>
           </a:p>
@@ -1622,7 +1622,7 @@
           <a:p>
             <a:fld id="{7043625E-8BC0-46E2-A81F-24B9F552ACCE}" type="datetimeFigureOut">
               <a:rPr lang="ko-KR" altLang="en-US" smtClean="0"/>
-              <a:t>2015-01-21</a:t>
+              <a:t>2015-01-23</a:t>
             </a:fld>
             <a:endParaRPr lang="ko-KR" altLang="en-US"/>
           </a:p>
@@ -1740,7 +1740,7 @@
           <a:p>
             <a:fld id="{7043625E-8BC0-46E2-A81F-24B9F552ACCE}" type="datetimeFigureOut">
               <a:rPr lang="ko-KR" altLang="en-US" smtClean="0"/>
-              <a:t>2015-01-21</a:t>
+              <a:t>2015-01-23</a:t>
             </a:fld>
             <a:endParaRPr lang="ko-KR" altLang="en-US"/>
           </a:p>
@@ -1835,7 +1835,7 @@
           <a:p>
             <a:fld id="{7043625E-8BC0-46E2-A81F-24B9F552ACCE}" type="datetimeFigureOut">
               <a:rPr lang="ko-KR" altLang="en-US" smtClean="0"/>
-              <a:t>2015-01-21</a:t>
+              <a:t>2015-01-23</a:t>
             </a:fld>
             <a:endParaRPr lang="ko-KR" altLang="en-US"/>
           </a:p>
@@ -2112,7 +2112,7 @@
           <a:p>
             <a:fld id="{7043625E-8BC0-46E2-A81F-24B9F552ACCE}" type="datetimeFigureOut">
               <a:rPr lang="ko-KR" altLang="en-US" smtClean="0"/>
-              <a:t>2015-01-21</a:t>
+              <a:t>2015-01-23</a:t>
             </a:fld>
             <a:endParaRPr lang="ko-KR" altLang="en-US"/>
           </a:p>
@@ -2365,7 +2365,7 @@
           <a:p>
             <a:fld id="{7043625E-8BC0-46E2-A81F-24B9F552ACCE}" type="datetimeFigureOut">
               <a:rPr lang="ko-KR" altLang="en-US" smtClean="0"/>
-              <a:t>2015-01-21</a:t>
+              <a:t>2015-01-23</a:t>
             </a:fld>
             <a:endParaRPr lang="ko-KR" altLang="en-US"/>
           </a:p>
@@ -2578,7 +2578,7 @@
           <a:p>
             <a:fld id="{7043625E-8BC0-46E2-A81F-24B9F552ACCE}" type="datetimeFigureOut">
               <a:rPr lang="ko-KR" altLang="en-US" smtClean="0"/>
-              <a:t>2015-01-21</a:t>
+              <a:t>2015-01-23</a:t>
             </a:fld>
             <a:endParaRPr lang="ko-KR" altLang="en-US"/>
           </a:p>
@@ -13421,14 +13421,14 @@
           <p:nvPr>
             <p:extLst>
               <p:ext uri="{D42A27DB-BD31-4B8C-83A1-F6EECF244321}">
-                <p14:modId xmlns:p14="http://schemas.microsoft.com/office/powerpoint/2010/main" val="2503107329"/>
+                <p14:modId xmlns:p14="http://schemas.microsoft.com/office/powerpoint/2010/main" val="3221447868"/>
               </p:ext>
             </p:extLst>
           </p:nvPr>
         </p:nvGraphicFramePr>
         <p:xfrm>
           <a:off x="1168400" y="1498599"/>
-          <a:ext cx="4165600" cy="3387510"/>
+          <a:ext cx="4165600" cy="3871440"/>
         </p:xfrm>
         <a:graphic>
           <a:graphicData uri="http://schemas.openxmlformats.org/drawingml/2006/table">
@@ -13665,6 +13665,38 @@
                       <a:r>
                         <a:rPr lang="ko-KR" altLang="en-US" dirty="0" smtClean="0"/>
                         <a:t>계정 등록</a:t>
+                      </a:r>
+                      <a:endParaRPr lang="ko-KR" altLang="en-US" dirty="0"/>
+                    </a:p>
+                  </a:txBody>
+                  <a:tcPr anchor="ctr"/>
+                </a:tc>
+              </a:tr>
+              <a:tr h="483930">
+                <a:tc>
+                  <a:txBody>
+                    <a:bodyPr/>
+                    <a:lstStyle/>
+                    <a:p>
+                      <a:pPr algn="ctr" latinLnBrk="1"/>
+                      <a:r>
+                        <a:rPr lang="en-US" altLang="ko-KR" dirty="0" smtClean="0"/>
+                        <a:t>&gt;</a:t>
+                      </a:r>
+                      <a:endParaRPr lang="ko-KR" altLang="en-US" dirty="0"/>
+                    </a:p>
+                  </a:txBody>
+                  <a:tcPr anchor="ctr"/>
+                </a:tc>
+                <a:tc>
+                  <a:txBody>
+                    <a:bodyPr/>
+                    <a:lstStyle/>
+                    <a:p>
+                      <a:pPr algn="l" latinLnBrk="1"/>
+                      <a:r>
+                        <a:rPr lang="ko-KR" altLang="en-US" smtClean="0"/>
+                        <a:t>업적 보기</a:t>
                       </a:r>
                       <a:endParaRPr lang="ko-KR" altLang="en-US" dirty="0"/>
                     </a:p>

</xml_diff>

<commit_message>
singe Map Move able
</commit_message>
<xml_diff>
--- a/화면정의서.pptx
+++ b/화면정의서.pptx
@@ -12492,6 +12492,206 @@
           </p:txBody>
         </p:sp>
       </p:grpSp>
+      <p:sp>
+        <p:nvSpPr>
+          <p:cNvPr id="9" name="모서리가 둥근 직사각형 8"/>
+          <p:cNvSpPr/>
+          <p:nvPr/>
+        </p:nvSpPr>
+        <p:spPr>
+          <a:xfrm>
+            <a:off x="1398812" y="5725089"/>
+            <a:ext cx="3801534" cy="110054"/>
+          </a:xfrm>
+          <a:prstGeom prst="roundRect">
+            <a:avLst/>
+          </a:prstGeom>
+        </p:spPr>
+        <p:style>
+          <a:lnRef idx="2">
+            <a:schemeClr val="accent2">
+              <a:shade val="50000"/>
+            </a:schemeClr>
+          </a:lnRef>
+          <a:fillRef idx="1">
+            <a:schemeClr val="accent2"/>
+          </a:fillRef>
+          <a:effectRef idx="0">
+            <a:schemeClr val="accent2"/>
+          </a:effectRef>
+          <a:fontRef idx="minor">
+            <a:schemeClr val="lt1"/>
+          </a:fontRef>
+        </p:style>
+        <p:txBody>
+          <a:bodyPr rtlCol="0" anchor="ctr"/>
+          <a:lstStyle/>
+          <a:p>
+            <a:pPr algn="ctr"/>
+            <a:endParaRPr lang="ko-KR" altLang="en-US"/>
+          </a:p>
+        </p:txBody>
+      </p:sp>
+      <p:sp>
+        <p:nvSpPr>
+          <p:cNvPr id="10" name="모서리가 둥근 직사각형 9"/>
+          <p:cNvSpPr/>
+          <p:nvPr/>
+        </p:nvSpPr>
+        <p:spPr>
+          <a:xfrm>
+            <a:off x="1364129" y="5690256"/>
+            <a:ext cx="147250" cy="177791"/>
+          </a:xfrm>
+          <a:prstGeom prst="roundRect">
+            <a:avLst/>
+          </a:prstGeom>
+        </p:spPr>
+        <p:style>
+          <a:lnRef idx="2">
+            <a:schemeClr val="accent1">
+              <a:shade val="50000"/>
+            </a:schemeClr>
+          </a:lnRef>
+          <a:fillRef idx="1">
+            <a:schemeClr val="accent1"/>
+          </a:fillRef>
+          <a:effectRef idx="0">
+            <a:schemeClr val="accent1"/>
+          </a:effectRef>
+          <a:fontRef idx="minor">
+            <a:schemeClr val="lt1"/>
+          </a:fontRef>
+        </p:style>
+        <p:txBody>
+          <a:bodyPr rtlCol="0" anchor="ctr"/>
+          <a:lstStyle/>
+          <a:p>
+            <a:pPr algn="ctr"/>
+            <a:endParaRPr lang="ko-KR" altLang="en-US"/>
+          </a:p>
+        </p:txBody>
+      </p:sp>
+      <p:sp>
+        <p:nvSpPr>
+          <p:cNvPr id="11" name="타원 10"/>
+          <p:cNvSpPr/>
+          <p:nvPr/>
+        </p:nvSpPr>
+        <p:spPr>
+          <a:xfrm>
+            <a:off x="1383691" y="5725089"/>
+            <a:ext cx="108126" cy="108126"/>
+          </a:xfrm>
+          <a:prstGeom prst="ellipse">
+            <a:avLst/>
+          </a:prstGeom>
+        </p:spPr>
+        <p:style>
+          <a:lnRef idx="2">
+            <a:schemeClr val="accent6">
+              <a:shade val="50000"/>
+            </a:schemeClr>
+          </a:lnRef>
+          <a:fillRef idx="1">
+            <a:schemeClr val="accent6"/>
+          </a:fillRef>
+          <a:effectRef idx="0">
+            <a:schemeClr val="accent6"/>
+          </a:effectRef>
+          <a:fontRef idx="minor">
+            <a:schemeClr val="lt1"/>
+          </a:fontRef>
+        </p:style>
+        <p:txBody>
+          <a:bodyPr rtlCol="0" anchor="ctr"/>
+          <a:lstStyle/>
+          <a:p>
+            <a:pPr algn="ctr"/>
+            <a:endParaRPr lang="ko-KR" altLang="en-US"/>
+          </a:p>
+        </p:txBody>
+      </p:sp>
+      <p:sp>
+        <p:nvSpPr>
+          <p:cNvPr id="49" name="타원 48"/>
+          <p:cNvSpPr/>
+          <p:nvPr/>
+        </p:nvSpPr>
+        <p:spPr>
+          <a:xfrm>
+            <a:off x="1725294" y="5725089"/>
+            <a:ext cx="108126" cy="108126"/>
+          </a:xfrm>
+          <a:prstGeom prst="ellipse">
+            <a:avLst/>
+          </a:prstGeom>
+        </p:spPr>
+        <p:style>
+          <a:lnRef idx="2">
+            <a:schemeClr val="accent6">
+              <a:shade val="50000"/>
+            </a:schemeClr>
+          </a:lnRef>
+          <a:fillRef idx="1">
+            <a:schemeClr val="accent6"/>
+          </a:fillRef>
+          <a:effectRef idx="0">
+            <a:schemeClr val="accent6"/>
+          </a:effectRef>
+          <a:fontRef idx="minor">
+            <a:schemeClr val="lt1"/>
+          </a:fontRef>
+        </p:style>
+        <p:txBody>
+          <a:bodyPr rtlCol="0" anchor="ctr"/>
+          <a:lstStyle/>
+          <a:p>
+            <a:pPr algn="ctr"/>
+            <a:endParaRPr lang="ko-KR" altLang="en-US"/>
+          </a:p>
+        </p:txBody>
+      </p:sp>
+      <p:sp>
+        <p:nvSpPr>
+          <p:cNvPr id="50" name="타원 49"/>
+          <p:cNvSpPr/>
+          <p:nvPr/>
+        </p:nvSpPr>
+        <p:spPr>
+          <a:xfrm>
+            <a:off x="2066897" y="5725089"/>
+            <a:ext cx="108126" cy="108126"/>
+          </a:xfrm>
+          <a:prstGeom prst="ellipse">
+            <a:avLst/>
+          </a:prstGeom>
+        </p:spPr>
+        <p:style>
+          <a:lnRef idx="2">
+            <a:schemeClr val="accent6">
+              <a:shade val="50000"/>
+            </a:schemeClr>
+          </a:lnRef>
+          <a:fillRef idx="1">
+            <a:schemeClr val="accent6"/>
+          </a:fillRef>
+          <a:effectRef idx="0">
+            <a:schemeClr val="accent6"/>
+          </a:effectRef>
+          <a:fontRef idx="minor">
+            <a:schemeClr val="lt1"/>
+          </a:fontRef>
+        </p:style>
+        <p:txBody>
+          <a:bodyPr rtlCol="0" anchor="ctr"/>
+          <a:lstStyle/>
+          <a:p>
+            <a:pPr algn="ctr"/>
+            <a:endParaRPr lang="ko-KR" altLang="en-US"/>
+          </a:p>
+        </p:txBody>
+      </p:sp>
     </p:spTree>
     <p:extLst>
       <p:ext uri="{BB962C8B-B14F-4D97-AF65-F5344CB8AC3E}">
@@ -12815,7 +13015,7 @@
           <p:nvPr>
             <p:extLst>
               <p:ext uri="{D42A27DB-BD31-4B8C-83A1-F6EECF244321}">
-                <p14:modId xmlns:p14="http://schemas.microsoft.com/office/powerpoint/2010/main" val="642898740"/>
+                <p14:modId xmlns:p14="http://schemas.microsoft.com/office/powerpoint/2010/main" val="2162033997"/>
               </p:ext>
             </p:extLst>
           </p:nvPr>
@@ -13095,6 +13295,149 @@
               <a:t>도움말</a:t>
             </a:r>
             <a:endParaRPr lang="ko-KR" altLang="en-US" dirty="0"/>
+          </a:p>
+        </p:txBody>
+      </p:sp>
+      <p:sp>
+        <p:nvSpPr>
+          <p:cNvPr id="8" name="직사각형 7"/>
+          <p:cNvSpPr/>
+          <p:nvPr/>
+        </p:nvSpPr>
+        <p:spPr>
+          <a:xfrm>
+            <a:off x="4674353" y="4579208"/>
+            <a:ext cx="329448" cy="245534"/>
+          </a:xfrm>
+          <a:prstGeom prst="rect">
+            <a:avLst/>
+          </a:prstGeom>
+        </p:spPr>
+        <p:style>
+          <a:lnRef idx="2">
+            <a:schemeClr val="accent1">
+              <a:shade val="50000"/>
+            </a:schemeClr>
+          </a:lnRef>
+          <a:fillRef idx="1">
+            <a:schemeClr val="accent1"/>
+          </a:fillRef>
+          <a:effectRef idx="0">
+            <a:schemeClr val="accent1"/>
+          </a:effectRef>
+          <a:fontRef idx="minor">
+            <a:schemeClr val="lt1"/>
+          </a:fontRef>
+        </p:style>
+        <p:txBody>
+          <a:bodyPr rtlCol="0" anchor="ctr"/>
+          <a:lstStyle/>
+          <a:p>
+            <a:pPr algn="ctr"/>
+            <a:endParaRPr lang="ko-KR" altLang="en-US"/>
+          </a:p>
+        </p:txBody>
+      </p:sp>
+      <p:sp>
+        <p:nvSpPr>
+          <p:cNvPr id="9" name="직사각형 8"/>
+          <p:cNvSpPr/>
+          <p:nvPr/>
+        </p:nvSpPr>
+        <p:spPr>
+          <a:xfrm>
+            <a:off x="4343400" y="4570742"/>
+            <a:ext cx="330952" cy="254000"/>
+          </a:xfrm>
+          <a:prstGeom prst="rect">
+            <a:avLst/>
+          </a:prstGeom>
+          <a:solidFill>
+            <a:schemeClr val="accent2"/>
+          </a:solidFill>
+        </p:spPr>
+        <p:style>
+          <a:lnRef idx="2">
+            <a:schemeClr val="accent1">
+              <a:shade val="50000"/>
+            </a:schemeClr>
+          </a:lnRef>
+          <a:fillRef idx="1">
+            <a:schemeClr val="accent1"/>
+          </a:fillRef>
+          <a:effectRef idx="0">
+            <a:schemeClr val="accent1"/>
+          </a:effectRef>
+          <a:fontRef idx="minor">
+            <a:schemeClr val="lt1"/>
+          </a:fontRef>
+        </p:style>
+        <p:txBody>
+          <a:bodyPr rtlCol="0" anchor="ctr"/>
+          <a:lstStyle/>
+          <a:p>
+            <a:pPr algn="ctr"/>
+            <a:endParaRPr lang="ko-KR" altLang="en-US"/>
+          </a:p>
+        </p:txBody>
+      </p:sp>
+      <p:sp>
+        <p:nvSpPr>
+          <p:cNvPr id="10" name="TextBox 9"/>
+          <p:cNvSpPr txBox="1"/>
+          <p:nvPr/>
+        </p:nvSpPr>
+        <p:spPr>
+          <a:xfrm>
+            <a:off x="4610719" y="4559242"/>
+            <a:ext cx="406532" cy="276999"/>
+          </a:xfrm>
+          <a:prstGeom prst="rect">
+            <a:avLst/>
+          </a:prstGeom>
+          <a:noFill/>
+        </p:spPr>
+        <p:txBody>
+          <a:bodyPr wrap="square" rtlCol="0">
+            <a:spAutoFit/>
+          </a:bodyPr>
+          <a:lstStyle/>
+          <a:p>
+            <a:r>
+              <a:rPr lang="en-US" altLang="ko-KR" sz="1200" dirty="0" smtClean="0"/>
+              <a:t>Off</a:t>
+            </a:r>
+            <a:endParaRPr lang="ko-KR" altLang="en-US" sz="1200" dirty="0"/>
+          </a:p>
+        </p:txBody>
+      </p:sp>
+      <p:sp>
+        <p:nvSpPr>
+          <p:cNvPr id="11" name="TextBox 10"/>
+          <p:cNvSpPr txBox="1"/>
+          <p:nvPr/>
+        </p:nvSpPr>
+        <p:spPr>
+          <a:xfrm>
+            <a:off x="4318847" y="4582326"/>
+            <a:ext cx="380058" cy="230832"/>
+          </a:xfrm>
+          <a:prstGeom prst="rect">
+            <a:avLst/>
+          </a:prstGeom>
+          <a:noFill/>
+        </p:spPr>
+        <p:txBody>
+          <a:bodyPr wrap="square" rtlCol="0">
+            <a:spAutoFit/>
+          </a:bodyPr>
+          <a:lstStyle/>
+          <a:p>
+            <a:r>
+              <a:rPr lang="en-US" altLang="ko-KR" sz="900" dirty="0" smtClean="0"/>
+              <a:t>On</a:t>
+            </a:r>
+            <a:endParaRPr lang="ko-KR" altLang="en-US" sz="900" dirty="0"/>
           </a:p>
         </p:txBody>
       </p:sp>

</xml_diff>

<commit_message>
scroll & game clear imprement
</commit_message>
<xml_diff>
--- a/화면정의서.pptx
+++ b/화면정의서.pptx
@@ -21,6 +21,7 @@
     <p:sldId id="270" r:id="rId15"/>
     <p:sldId id="271" r:id="rId16"/>
     <p:sldId id="272" r:id="rId17"/>
+    <p:sldId id="277" r:id="rId18"/>
   </p:sldIdLst>
   <p:sldSz cx="12192000" cy="6858000"/>
   <p:notesSz cx="6858000" cy="9144000"/>
@@ -258,7 +259,7 @@
           <a:p>
             <a:fld id="{7043625E-8BC0-46E2-A81F-24B9F552ACCE}" type="datetimeFigureOut">
               <a:rPr lang="ko-KR" altLang="en-US" smtClean="0"/>
-              <a:t>2015-01-28</a:t>
+              <a:t>2015-02-10</a:t>
             </a:fld>
             <a:endParaRPr lang="ko-KR" altLang="en-US"/>
           </a:p>
@@ -428,7 +429,7 @@
           <a:p>
             <a:fld id="{7043625E-8BC0-46E2-A81F-24B9F552ACCE}" type="datetimeFigureOut">
               <a:rPr lang="ko-KR" altLang="en-US" smtClean="0"/>
-              <a:t>2015-01-28</a:t>
+              <a:t>2015-02-10</a:t>
             </a:fld>
             <a:endParaRPr lang="ko-KR" altLang="en-US"/>
           </a:p>
@@ -608,7 +609,7 @@
           <a:p>
             <a:fld id="{7043625E-8BC0-46E2-A81F-24B9F552ACCE}" type="datetimeFigureOut">
               <a:rPr lang="ko-KR" altLang="en-US" smtClean="0"/>
-              <a:t>2015-01-28</a:t>
+              <a:t>2015-02-10</a:t>
             </a:fld>
             <a:endParaRPr lang="ko-KR" altLang="en-US"/>
           </a:p>
@@ -778,7 +779,7 @@
           <a:p>
             <a:fld id="{7043625E-8BC0-46E2-A81F-24B9F552ACCE}" type="datetimeFigureOut">
               <a:rPr lang="ko-KR" altLang="en-US" smtClean="0"/>
-              <a:t>2015-01-28</a:t>
+              <a:t>2015-02-10</a:t>
             </a:fld>
             <a:endParaRPr lang="ko-KR" altLang="en-US"/>
           </a:p>
@@ -1024,7 +1025,7 @@
           <a:p>
             <a:fld id="{7043625E-8BC0-46E2-A81F-24B9F552ACCE}" type="datetimeFigureOut">
               <a:rPr lang="ko-KR" altLang="en-US" smtClean="0"/>
-              <a:t>2015-01-28</a:t>
+              <a:t>2015-02-10</a:t>
             </a:fld>
             <a:endParaRPr lang="ko-KR" altLang="en-US"/>
           </a:p>
@@ -1256,7 +1257,7 @@
           <a:p>
             <a:fld id="{7043625E-8BC0-46E2-A81F-24B9F552ACCE}" type="datetimeFigureOut">
               <a:rPr lang="ko-KR" altLang="en-US" smtClean="0"/>
-              <a:t>2015-01-28</a:t>
+              <a:t>2015-02-10</a:t>
             </a:fld>
             <a:endParaRPr lang="ko-KR" altLang="en-US"/>
           </a:p>
@@ -1623,7 +1624,7 @@
           <a:p>
             <a:fld id="{7043625E-8BC0-46E2-A81F-24B9F552ACCE}" type="datetimeFigureOut">
               <a:rPr lang="ko-KR" altLang="en-US" smtClean="0"/>
-              <a:t>2015-01-28</a:t>
+              <a:t>2015-02-10</a:t>
             </a:fld>
             <a:endParaRPr lang="ko-KR" altLang="en-US"/>
           </a:p>
@@ -1741,7 +1742,7 @@
           <a:p>
             <a:fld id="{7043625E-8BC0-46E2-A81F-24B9F552ACCE}" type="datetimeFigureOut">
               <a:rPr lang="ko-KR" altLang="en-US" smtClean="0"/>
-              <a:t>2015-01-28</a:t>
+              <a:t>2015-02-10</a:t>
             </a:fld>
             <a:endParaRPr lang="ko-KR" altLang="en-US"/>
           </a:p>
@@ -1836,7 +1837,7 @@
           <a:p>
             <a:fld id="{7043625E-8BC0-46E2-A81F-24B9F552ACCE}" type="datetimeFigureOut">
               <a:rPr lang="ko-KR" altLang="en-US" smtClean="0"/>
-              <a:t>2015-01-28</a:t>
+              <a:t>2015-02-10</a:t>
             </a:fld>
             <a:endParaRPr lang="ko-KR" altLang="en-US"/>
           </a:p>
@@ -2113,7 +2114,7 @@
           <a:p>
             <a:fld id="{7043625E-8BC0-46E2-A81F-24B9F552ACCE}" type="datetimeFigureOut">
               <a:rPr lang="ko-KR" altLang="en-US" smtClean="0"/>
-              <a:t>2015-01-28</a:t>
+              <a:t>2015-02-10</a:t>
             </a:fld>
             <a:endParaRPr lang="ko-KR" altLang="en-US"/>
           </a:p>
@@ -2366,7 +2367,7 @@
           <a:p>
             <a:fld id="{7043625E-8BC0-46E2-A81F-24B9F552ACCE}" type="datetimeFigureOut">
               <a:rPr lang="ko-KR" altLang="en-US" smtClean="0"/>
-              <a:t>2015-01-28</a:t>
+              <a:t>2015-02-10</a:t>
             </a:fld>
             <a:endParaRPr lang="ko-KR" altLang="en-US"/>
           </a:p>
@@ -2579,7 +2580,7 @@
           <a:p>
             <a:fld id="{7043625E-8BC0-46E2-A81F-24B9F552ACCE}" type="datetimeFigureOut">
               <a:rPr lang="ko-KR" altLang="en-US" smtClean="0"/>
-              <a:t>2015-01-28</a:t>
+              <a:t>2015-02-10</a:t>
             </a:fld>
             <a:endParaRPr lang="ko-KR" altLang="en-US"/>
           </a:p>
@@ -11037,6 +11038,517 @@
     <p:extLst>
       <p:ext uri="{BB962C8B-B14F-4D97-AF65-F5344CB8AC3E}">
         <p14:creationId xmlns:p14="http://schemas.microsoft.com/office/powerpoint/2010/main" val="2915361221"/>
+      </p:ext>
+    </p:extLst>
+  </p:cSld>
+  <p:clrMapOvr>
+    <a:masterClrMapping/>
+  </p:clrMapOvr>
+  <p:timing>
+    <p:tnLst>
+      <p:par>
+        <p:cTn id="1" dur="indefinite" restart="never" nodeType="tmRoot"/>
+      </p:par>
+    </p:tnLst>
+  </p:timing>
+</p:sld>
+</file>
+
+<file path=ppt/slides/slide17.xml><?xml version="1.0" encoding="utf-8"?>
+<p:sld xmlns:a="http://schemas.openxmlformats.org/drawingml/2006/main" xmlns:r="http://schemas.openxmlformats.org/officeDocument/2006/relationships" xmlns:p="http://schemas.openxmlformats.org/presentationml/2006/main">
+  <p:cSld>
+    <p:spTree>
+      <p:nvGrpSpPr>
+        <p:cNvPr id="1" name=""/>
+        <p:cNvGrpSpPr/>
+        <p:nvPr/>
+      </p:nvGrpSpPr>
+      <p:grpSpPr>
+        <a:xfrm>
+          <a:off x="0" y="0"/>
+          <a:ext cx="0" cy="0"/>
+          <a:chOff x="0" y="0"/>
+          <a:chExt cx="0" cy="0"/>
+        </a:xfrm>
+      </p:grpSpPr>
+      <p:sp>
+        <p:nvSpPr>
+          <p:cNvPr id="4" name="직사각형 3"/>
+          <p:cNvSpPr/>
+          <p:nvPr/>
+        </p:nvSpPr>
+        <p:spPr>
+          <a:xfrm>
+            <a:off x="863600" y="313263"/>
+            <a:ext cx="4826000" cy="6197600"/>
+          </a:xfrm>
+          <a:prstGeom prst="rect">
+            <a:avLst/>
+          </a:prstGeom>
+          <a:solidFill>
+            <a:schemeClr val="bg1"/>
+          </a:solidFill>
+          <a:ln>
+            <a:solidFill>
+              <a:schemeClr val="tx1"/>
+            </a:solidFill>
+          </a:ln>
+        </p:spPr>
+        <p:style>
+          <a:lnRef idx="2">
+            <a:schemeClr val="accent1">
+              <a:shade val="50000"/>
+            </a:schemeClr>
+          </a:lnRef>
+          <a:fillRef idx="1">
+            <a:schemeClr val="accent1"/>
+          </a:fillRef>
+          <a:effectRef idx="0">
+            <a:schemeClr val="accent1"/>
+          </a:effectRef>
+          <a:fontRef idx="minor">
+            <a:schemeClr val="lt1"/>
+          </a:fontRef>
+        </p:style>
+        <p:txBody>
+          <a:bodyPr rtlCol="0" anchor="ctr"/>
+          <a:lstStyle/>
+          <a:p>
+            <a:pPr algn="ctr"/>
+            <a:endParaRPr lang="ko-KR" altLang="en-US" dirty="0"/>
+          </a:p>
+        </p:txBody>
+      </p:sp>
+      <p:graphicFrame>
+        <p:nvGraphicFramePr>
+          <p:cNvPr id="5" name="표 4"/>
+          <p:cNvGraphicFramePr>
+            <a:graphicFrameLocks noGrp="1"/>
+          </p:cNvGraphicFramePr>
+          <p:nvPr>
+            <p:extLst>
+              <p:ext uri="{D42A27DB-BD31-4B8C-83A1-F6EECF244321}">
+                <p14:modId xmlns:p14="http://schemas.microsoft.com/office/powerpoint/2010/main" val="3436872498"/>
+              </p:ext>
+            </p:extLst>
+          </p:nvPr>
+        </p:nvGraphicFramePr>
+        <p:xfrm>
+          <a:off x="6392332" y="719664"/>
+          <a:ext cx="4174068" cy="3007344"/>
+        </p:xfrm>
+        <a:graphic>
+          <a:graphicData uri="http://schemas.openxmlformats.org/drawingml/2006/table">
+            <a:tbl>
+              <a:tblPr>
+                <a:tableStyleId>{073A0DAA-6AF3-43AB-8588-CEC1D06C72B9}</a:tableStyleId>
+              </a:tblPr>
+              <a:tblGrid>
+                <a:gridCol w="2087034"/>
+                <a:gridCol w="2087034"/>
+              </a:tblGrid>
+              <a:tr h="732867">
+                <a:tc>
+                  <a:txBody>
+                    <a:bodyPr/>
+                    <a:lstStyle/>
+                    <a:p>
+                      <a:pPr algn="ctr" latinLnBrk="1"/>
+                      <a:r>
+                        <a:rPr lang="ko-KR" altLang="en-US" dirty="0" smtClean="0"/>
+                        <a:t>구분</a:t>
+                      </a:r>
+                      <a:endParaRPr lang="ko-KR" altLang="en-US" dirty="0"/>
+                    </a:p>
+                  </a:txBody>
+                  <a:tcPr anchor="ctr">
+                    <a:solidFill>
+                      <a:schemeClr val="tx1">
+                        <a:lumMod val="50000"/>
+                        <a:lumOff val="50000"/>
+                      </a:schemeClr>
+                    </a:solidFill>
+                  </a:tcPr>
+                </a:tc>
+                <a:tc>
+                  <a:txBody>
+                    <a:bodyPr/>
+                    <a:lstStyle/>
+                    <a:p>
+                      <a:pPr algn="ctr" latinLnBrk="1"/>
+                      <a:r>
+                        <a:rPr lang="ko-KR" altLang="en-US" dirty="0" smtClean="0"/>
+                        <a:t>내용</a:t>
+                      </a:r>
+                      <a:endParaRPr lang="ko-KR" altLang="en-US" dirty="0"/>
+                    </a:p>
+                  </a:txBody>
+                  <a:tcPr anchor="ctr">
+                    <a:solidFill>
+                      <a:schemeClr val="tx1">
+                        <a:lumMod val="50000"/>
+                        <a:lumOff val="50000"/>
+                      </a:schemeClr>
+                    </a:solidFill>
+                  </a:tcPr>
+                </a:tc>
+              </a:tr>
+              <a:tr h="1109049">
+                <a:tc>
+                  <a:txBody>
+                    <a:bodyPr/>
+                    <a:lstStyle/>
+                    <a:p>
+                      <a:pPr algn="ctr" latinLnBrk="1"/>
+                      <a:r>
+                        <a:rPr lang="ko-KR" altLang="en-US" dirty="0" smtClean="0"/>
+                        <a:t>화면 번호</a:t>
+                      </a:r>
+                      <a:r>
+                        <a:rPr lang="en-US" altLang="ko-KR" dirty="0" smtClean="0"/>
+                        <a:t/>
+                      </a:r>
+                      <a:br>
+                        <a:rPr lang="en-US" altLang="ko-KR" dirty="0" smtClean="0"/>
+                      </a:br>
+                      <a:r>
+                        <a:rPr lang="en-US" altLang="ko-KR" dirty="0" smtClean="0"/>
+                        <a:t>(</a:t>
+                      </a:r>
+                      <a:r>
+                        <a:rPr lang="ko-KR" altLang="en-US" dirty="0" err="1" smtClean="0"/>
+                        <a:t>싱글</a:t>
+                      </a:r>
+                      <a:r>
+                        <a:rPr lang="ko-KR" altLang="en-US" dirty="0" smtClean="0"/>
+                        <a:t> </a:t>
+                      </a:r>
+                      <a:r>
+                        <a:rPr lang="ko-KR" altLang="en-US" dirty="0" err="1" smtClean="0"/>
+                        <a:t>클리어</a:t>
+                      </a:r>
+                      <a:r>
+                        <a:rPr lang="ko-KR" altLang="en-US" dirty="0" smtClean="0"/>
+                        <a:t> 화면</a:t>
+                      </a:r>
+                      <a:r>
+                        <a:rPr lang="en-US" altLang="ko-KR" dirty="0" smtClean="0"/>
+                        <a:t>)</a:t>
+                      </a:r>
+                      <a:endParaRPr lang="ko-KR" altLang="en-US" dirty="0"/>
+                    </a:p>
+                  </a:txBody>
+                  <a:tcPr anchor="ctr"/>
+                </a:tc>
+                <a:tc>
+                  <a:txBody>
+                    <a:bodyPr/>
+                    <a:lstStyle/>
+                    <a:p>
+                      <a:pPr algn="ctr" latinLnBrk="1"/>
+                      <a:r>
+                        <a:rPr lang="en-US" altLang="ko-KR" smtClean="0"/>
+                        <a:t>10-01</a:t>
+                      </a:r>
+                      <a:endParaRPr lang="ko-KR" altLang="en-US" dirty="0"/>
+                    </a:p>
+                  </a:txBody>
+                  <a:tcPr anchor="ctr"/>
+                </a:tc>
+              </a:tr>
+              <a:tr h="1165428">
+                <a:tc>
+                  <a:txBody>
+                    <a:bodyPr/>
+                    <a:lstStyle/>
+                    <a:p>
+                      <a:pPr algn="ctr" latinLnBrk="1"/>
+                      <a:r>
+                        <a:rPr lang="en-US" altLang="ko-KR" dirty="0" smtClean="0"/>
+                        <a:t>btn01</a:t>
+                      </a:r>
+                      <a:endParaRPr lang="ko-KR" altLang="en-US" dirty="0"/>
+                    </a:p>
+                  </a:txBody>
+                  <a:tcPr anchor="ctr"/>
+                </a:tc>
+                <a:tc>
+                  <a:txBody>
+                    <a:bodyPr/>
+                    <a:lstStyle/>
+                    <a:p>
+                      <a:pPr algn="ctr" latinLnBrk="1"/>
+                      <a:endParaRPr lang="ko-KR" altLang="en-US" dirty="0"/>
+                    </a:p>
+                  </a:txBody>
+                  <a:tcPr anchor="ctr"/>
+                </a:tc>
+              </a:tr>
+            </a:tbl>
+          </a:graphicData>
+        </a:graphic>
+      </p:graphicFrame>
+      <p:sp>
+        <p:nvSpPr>
+          <p:cNvPr id="2" name="모서리가 둥근 직사각형 1"/>
+          <p:cNvSpPr/>
+          <p:nvPr/>
+        </p:nvSpPr>
+        <p:spPr>
+          <a:xfrm>
+            <a:off x="1388533" y="5012266"/>
+            <a:ext cx="1202267" cy="618067"/>
+          </a:xfrm>
+          <a:prstGeom prst="roundRect">
+            <a:avLst/>
+          </a:prstGeom>
+        </p:spPr>
+        <p:style>
+          <a:lnRef idx="2">
+            <a:schemeClr val="accent1">
+              <a:shade val="50000"/>
+            </a:schemeClr>
+          </a:lnRef>
+          <a:fillRef idx="1">
+            <a:schemeClr val="accent1"/>
+          </a:fillRef>
+          <a:effectRef idx="0">
+            <a:schemeClr val="accent1"/>
+          </a:effectRef>
+          <a:fontRef idx="minor">
+            <a:schemeClr val="lt1"/>
+          </a:fontRef>
+        </p:style>
+        <p:txBody>
+          <a:bodyPr rtlCol="0" anchor="ctr"/>
+          <a:lstStyle/>
+          <a:p>
+            <a:pPr algn="ctr"/>
+            <a:r>
+              <a:rPr lang="en-US" altLang="ko-KR" dirty="0" smtClean="0"/>
+              <a:t>Exit</a:t>
+            </a:r>
+            <a:endParaRPr lang="ko-KR" altLang="en-US" dirty="0"/>
+          </a:p>
+        </p:txBody>
+      </p:sp>
+      <p:sp>
+        <p:nvSpPr>
+          <p:cNvPr id="9" name="모서리가 둥근 직사각형 8"/>
+          <p:cNvSpPr/>
+          <p:nvPr/>
+        </p:nvSpPr>
+        <p:spPr>
+          <a:xfrm>
+            <a:off x="3962399" y="5012266"/>
+            <a:ext cx="1202267" cy="618067"/>
+          </a:xfrm>
+          <a:prstGeom prst="roundRect">
+            <a:avLst/>
+          </a:prstGeom>
+        </p:spPr>
+        <p:style>
+          <a:lnRef idx="2">
+            <a:schemeClr val="accent1">
+              <a:shade val="50000"/>
+            </a:schemeClr>
+          </a:lnRef>
+          <a:fillRef idx="1">
+            <a:schemeClr val="accent1"/>
+          </a:fillRef>
+          <a:effectRef idx="0">
+            <a:schemeClr val="accent1"/>
+          </a:effectRef>
+          <a:fontRef idx="minor">
+            <a:schemeClr val="lt1"/>
+          </a:fontRef>
+        </p:style>
+        <p:txBody>
+          <a:bodyPr rtlCol="0" anchor="ctr"/>
+          <a:lstStyle/>
+          <a:p>
+            <a:pPr algn="ctr"/>
+            <a:r>
+              <a:rPr lang="en-US" altLang="ko-KR" dirty="0" smtClean="0"/>
+              <a:t>Next</a:t>
+            </a:r>
+            <a:endParaRPr lang="ko-KR" altLang="en-US" dirty="0"/>
+          </a:p>
+        </p:txBody>
+      </p:sp>
+      <p:sp>
+        <p:nvSpPr>
+          <p:cNvPr id="10" name="모서리가 둥근 직사각형 9"/>
+          <p:cNvSpPr/>
+          <p:nvPr/>
+        </p:nvSpPr>
+        <p:spPr>
+          <a:xfrm>
+            <a:off x="2675466" y="5003799"/>
+            <a:ext cx="1202267" cy="618067"/>
+          </a:xfrm>
+          <a:prstGeom prst="roundRect">
+            <a:avLst/>
+          </a:prstGeom>
+        </p:spPr>
+        <p:style>
+          <a:lnRef idx="2">
+            <a:schemeClr val="accent1">
+              <a:shade val="50000"/>
+            </a:schemeClr>
+          </a:lnRef>
+          <a:fillRef idx="1">
+            <a:schemeClr val="accent1"/>
+          </a:fillRef>
+          <a:effectRef idx="0">
+            <a:schemeClr val="accent1"/>
+          </a:effectRef>
+          <a:fontRef idx="minor">
+            <a:schemeClr val="lt1"/>
+          </a:fontRef>
+        </p:style>
+        <p:txBody>
+          <a:bodyPr rtlCol="0" anchor="ctr"/>
+          <a:lstStyle/>
+          <a:p>
+            <a:pPr algn="ctr"/>
+            <a:r>
+              <a:rPr lang="en-US" altLang="ko-KR" dirty="0" smtClean="0"/>
+              <a:t>Retry</a:t>
+            </a:r>
+            <a:endParaRPr lang="ko-KR" altLang="en-US" dirty="0"/>
+          </a:p>
+        </p:txBody>
+      </p:sp>
+      <p:sp>
+        <p:nvSpPr>
+          <p:cNvPr id="11" name="모서리가 둥근 직사각형 10"/>
+          <p:cNvSpPr/>
+          <p:nvPr/>
+        </p:nvSpPr>
+        <p:spPr>
+          <a:xfrm>
+            <a:off x="1828799" y="1625600"/>
+            <a:ext cx="2895601" cy="1761067"/>
+          </a:xfrm>
+          <a:prstGeom prst="roundRect">
+            <a:avLst/>
+          </a:prstGeom>
+        </p:spPr>
+        <p:style>
+          <a:lnRef idx="2">
+            <a:schemeClr val="accent1">
+              <a:shade val="50000"/>
+            </a:schemeClr>
+          </a:lnRef>
+          <a:fillRef idx="1">
+            <a:schemeClr val="accent1"/>
+          </a:fillRef>
+          <a:effectRef idx="0">
+            <a:schemeClr val="accent1"/>
+          </a:effectRef>
+          <a:fontRef idx="minor">
+            <a:schemeClr val="lt1"/>
+          </a:fontRef>
+        </p:style>
+        <p:txBody>
+          <a:bodyPr rtlCol="0" anchor="ctr"/>
+          <a:lstStyle/>
+          <a:p>
+            <a:pPr algn="ctr"/>
+            <a:r>
+              <a:rPr lang="en-US" altLang="ko-KR" sz="3600" dirty="0" smtClean="0"/>
+              <a:t>Stage Clear</a:t>
+            </a:r>
+          </a:p>
+          <a:p>
+            <a:pPr algn="ctr"/>
+            <a:r>
+              <a:rPr lang="ko-KR" altLang="en-US" sz="3600" dirty="0" smtClean="0"/>
+              <a:t>별 별 별</a:t>
+            </a:r>
+            <a:endParaRPr lang="ko-KR" altLang="en-US" sz="3600" dirty="0"/>
+          </a:p>
+        </p:txBody>
+      </p:sp>
+      <p:sp>
+        <p:nvSpPr>
+          <p:cNvPr id="6" name="TextBox 5"/>
+          <p:cNvSpPr txBox="1"/>
+          <p:nvPr/>
+        </p:nvSpPr>
+        <p:spPr>
+          <a:xfrm>
+            <a:off x="2488563" y="3615266"/>
+            <a:ext cx="1576072" cy="646331"/>
+          </a:xfrm>
+          <a:prstGeom prst="rect">
+            <a:avLst/>
+          </a:prstGeom>
+          <a:noFill/>
+        </p:spPr>
+        <p:txBody>
+          <a:bodyPr wrap="none" rtlCol="0">
+            <a:spAutoFit/>
+          </a:bodyPr>
+          <a:lstStyle/>
+          <a:p>
+            <a:r>
+              <a:rPr lang="ko-KR" altLang="en-US" dirty="0" smtClean="0"/>
+              <a:t>이동횟수 </a:t>
+            </a:r>
+            <a:r>
+              <a:rPr lang="en-US" altLang="ko-KR" dirty="0" smtClean="0"/>
+              <a:t>: 10</a:t>
+            </a:r>
+          </a:p>
+          <a:p>
+            <a:r>
+              <a:rPr lang="ko-KR" altLang="en-US" dirty="0" smtClean="0"/>
+              <a:t>실패횟수 </a:t>
+            </a:r>
+            <a:r>
+              <a:rPr lang="en-US" altLang="ko-KR" dirty="0" smtClean="0"/>
+              <a:t>: 2</a:t>
+            </a:r>
+            <a:endParaRPr lang="ko-KR" altLang="en-US" dirty="0"/>
+          </a:p>
+        </p:txBody>
+      </p:sp>
+      <p:sp>
+        <p:nvSpPr>
+          <p:cNvPr id="7" name="TextBox 6"/>
+          <p:cNvSpPr txBox="1"/>
+          <p:nvPr/>
+        </p:nvSpPr>
+        <p:spPr>
+          <a:xfrm>
+            <a:off x="3451487" y="1165945"/>
+            <a:ext cx="1272913" cy="400110"/>
+          </a:xfrm>
+          <a:prstGeom prst="rect">
+            <a:avLst/>
+          </a:prstGeom>
+          <a:noFill/>
+        </p:spPr>
+        <p:txBody>
+          <a:bodyPr wrap="none" rtlCol="0">
+            <a:spAutoFit/>
+          </a:bodyPr>
+          <a:lstStyle/>
+          <a:p>
+            <a:r>
+              <a:rPr lang="en-US" altLang="ko-KR" sz="2000" dirty="0" err="1" smtClean="0"/>
+              <a:t>Is_Perfect</a:t>
+            </a:r>
+            <a:endParaRPr lang="ko-KR" altLang="en-US" sz="2000" dirty="0"/>
+          </a:p>
+        </p:txBody>
+      </p:sp>
+    </p:spTree>
+    <p:extLst>
+      <p:ext uri="{BB962C8B-B14F-4D97-AF65-F5344CB8AC3E}">
+        <p14:creationId xmlns:p14="http://schemas.microsoft.com/office/powerpoint/2010/main" val="4046687310"/>
       </p:ext>
     </p:extLst>
   </p:cSld>

</xml_diff>